<commit_message>
To beam impedance reduction techniques
</commit_message>
<xml_diff>
--- a/Bench_Top_Measurements/figures/wire_meas_single_wire.pptx
+++ b/Bench_Top_Measurements/figures/wire_meas_single_wire.pptx
@@ -288,7 +288,7 @@
           <a:p>
             <a:fld id="{08401B3C-8A99-46DD-A984-7821384BD389}" type="datetimeFigureOut">
               <a:rPr lang="en-GB" smtClean="0"/>
-              <a:t>06/12/2012</a:t>
+              <a:t>22/01/2013</a:t>
             </a:fld>
             <a:endParaRPr lang="en-GB"/>
           </a:p>
@@ -458,7 +458,7 @@
           <a:p>
             <a:fld id="{08401B3C-8A99-46DD-A984-7821384BD389}" type="datetimeFigureOut">
               <a:rPr lang="en-GB" smtClean="0"/>
-              <a:t>06/12/2012</a:t>
+              <a:t>22/01/2013</a:t>
             </a:fld>
             <a:endParaRPr lang="en-GB"/>
           </a:p>
@@ -638,7 +638,7 @@
           <a:p>
             <a:fld id="{08401B3C-8A99-46DD-A984-7821384BD389}" type="datetimeFigureOut">
               <a:rPr lang="en-GB" smtClean="0"/>
-              <a:t>06/12/2012</a:t>
+              <a:t>22/01/2013</a:t>
             </a:fld>
             <a:endParaRPr lang="en-GB"/>
           </a:p>
@@ -808,7 +808,7 @@
           <a:p>
             <a:fld id="{08401B3C-8A99-46DD-A984-7821384BD389}" type="datetimeFigureOut">
               <a:rPr lang="en-GB" smtClean="0"/>
-              <a:t>06/12/2012</a:t>
+              <a:t>22/01/2013</a:t>
             </a:fld>
             <a:endParaRPr lang="en-GB"/>
           </a:p>
@@ -1054,7 +1054,7 @@
           <a:p>
             <a:fld id="{08401B3C-8A99-46DD-A984-7821384BD389}" type="datetimeFigureOut">
               <a:rPr lang="en-GB" smtClean="0"/>
-              <a:t>06/12/2012</a:t>
+              <a:t>22/01/2013</a:t>
             </a:fld>
             <a:endParaRPr lang="en-GB"/>
           </a:p>
@@ -1342,7 +1342,7 @@
           <a:p>
             <a:fld id="{08401B3C-8A99-46DD-A984-7821384BD389}" type="datetimeFigureOut">
               <a:rPr lang="en-GB" smtClean="0"/>
-              <a:t>06/12/2012</a:t>
+              <a:t>22/01/2013</a:t>
             </a:fld>
             <a:endParaRPr lang="en-GB"/>
           </a:p>
@@ -1764,7 +1764,7 @@
           <a:p>
             <a:fld id="{08401B3C-8A99-46DD-A984-7821384BD389}" type="datetimeFigureOut">
               <a:rPr lang="en-GB" smtClean="0"/>
-              <a:t>06/12/2012</a:t>
+              <a:t>22/01/2013</a:t>
             </a:fld>
             <a:endParaRPr lang="en-GB"/>
           </a:p>
@@ -1882,7 +1882,7 @@
           <a:p>
             <a:fld id="{08401B3C-8A99-46DD-A984-7821384BD389}" type="datetimeFigureOut">
               <a:rPr lang="en-GB" smtClean="0"/>
-              <a:t>06/12/2012</a:t>
+              <a:t>22/01/2013</a:t>
             </a:fld>
             <a:endParaRPr lang="en-GB"/>
           </a:p>
@@ -1977,7 +1977,7 @@
           <a:p>
             <a:fld id="{08401B3C-8A99-46DD-A984-7821384BD389}" type="datetimeFigureOut">
               <a:rPr lang="en-GB" smtClean="0"/>
-              <a:t>06/12/2012</a:t>
+              <a:t>22/01/2013</a:t>
             </a:fld>
             <a:endParaRPr lang="en-GB"/>
           </a:p>
@@ -2254,7 +2254,7 @@
           <a:p>
             <a:fld id="{08401B3C-8A99-46DD-A984-7821384BD389}" type="datetimeFigureOut">
               <a:rPr lang="en-GB" smtClean="0"/>
-              <a:t>06/12/2012</a:t>
+              <a:t>22/01/2013</a:t>
             </a:fld>
             <a:endParaRPr lang="en-GB"/>
           </a:p>
@@ -2507,7 +2507,7 @@
           <a:p>
             <a:fld id="{08401B3C-8A99-46DD-A984-7821384BD389}" type="datetimeFigureOut">
               <a:rPr lang="en-GB" smtClean="0"/>
-              <a:t>06/12/2012</a:t>
+              <a:t>22/01/2013</a:t>
             </a:fld>
             <a:endParaRPr lang="en-GB"/>
           </a:p>
@@ -2720,7 +2720,7 @@
           <a:p>
             <a:fld id="{08401B3C-8A99-46DD-A984-7821384BD389}" type="datetimeFigureOut">
               <a:rPr lang="en-GB" smtClean="0"/>
-              <a:t>06/12/2012</a:t>
+              <a:t>22/01/2013</a:t>
             </a:fld>
             <a:endParaRPr lang="en-GB"/>
           </a:p>
@@ -3589,8 +3589,8 @@
           </a:fontRef>
         </p:style>
       </p:cxnSp>
-      <mc:AlternateContent xmlns:mc="http://schemas.openxmlformats.org/markup-compatibility/2006">
-        <mc:Choice xmlns:a14="http://schemas.microsoft.com/office/drawing/2010/main" Requires="a14">
+      <mc:AlternateContent xmlns:mc="http://schemas.openxmlformats.org/markup-compatibility/2006" xmlns:a14="http://schemas.microsoft.com/office/drawing/2010/main">
+        <mc:Choice Requires="a14">
           <p:sp>
             <p:nvSpPr>
               <p:cNvPr id="40" name="TextBox 39"/>
@@ -3613,6 +3613,7 @@
               </a:bodyPr>
               <a:lstStyle/>
               <a:p>
+                <a:pPr/>
                 <a14:m>
                   <m:oMathPara xmlns:m="http://schemas.openxmlformats.org/officeDocument/2006/math">
                     <m:oMathParaPr>
@@ -3643,7 +3644,7 @@
             </p:txBody>
           </p:sp>
         </mc:Choice>
-        <mc:Fallback>
+        <mc:Fallback xmlns="">
           <p:sp>
             <p:nvSpPr>
               <p:cNvPr id="40" name="TextBox 39"/>
@@ -3682,8 +3683,8 @@
           </p:sp>
         </mc:Fallback>
       </mc:AlternateContent>
-      <mc:AlternateContent xmlns:mc="http://schemas.openxmlformats.org/markup-compatibility/2006">
-        <mc:Choice xmlns:a14="http://schemas.microsoft.com/office/drawing/2010/main" Requires="a14">
+      <mc:AlternateContent xmlns:mc="http://schemas.openxmlformats.org/markup-compatibility/2006" xmlns:a14="http://schemas.microsoft.com/office/drawing/2010/main">
+        <mc:Choice Requires="a14">
           <p:sp>
             <p:nvSpPr>
               <p:cNvPr id="41" name="TextBox 40"/>
@@ -3706,6 +3707,7 @@
               </a:bodyPr>
               <a:lstStyle/>
               <a:p>
+                <a:pPr/>
                 <a14:m>
                   <m:oMathPara xmlns:m="http://schemas.openxmlformats.org/officeDocument/2006/math">
                     <m:oMathParaPr>
@@ -3736,7 +3738,7 @@
             </p:txBody>
           </p:sp>
         </mc:Choice>
-        <mc:Fallback>
+        <mc:Fallback xmlns="">
           <p:sp>
             <p:nvSpPr>
               <p:cNvPr id="41" name="TextBox 40"/>
@@ -3786,7 +3788,7 @@
             <p:spPr>
               <a:xfrm>
                 <a:off x="2665001" y="124586"/>
-                <a:ext cx="614142" cy="400110"/>
+                <a:ext cx="498342" cy="400110"/>
               </a:xfrm>
               <a:prstGeom prst="rect">
                 <a:avLst/>
@@ -3799,6 +3801,7 @@
               </a:bodyPr>
               <a:lstStyle/>
               <a:p>
+                <a:pPr/>
                 <a14:m>
                   <m:oMathPara xmlns:m="http://schemas.openxmlformats.org/officeDocument/2006/math">
                     <m:oMathParaPr>
@@ -3826,7 +3829,7 @@
                             <a:rPr lang="en-GB" sz="2000" b="0" i="1" smtClean="0">
                               <a:latin typeface="Cambria Math"/>
                             </a:rPr>
-                            <m:t>𝑐h</m:t>
+                            <m:t>𝑐</m:t>
                           </m:r>
                         </m:sub>
                       </m:sSub>
@@ -3850,7 +3853,7 @@
             <p:spPr>
               <a:xfrm>
                 <a:off x="2665001" y="124586"/>
-                <a:ext cx="614142" cy="400110"/>
+                <a:ext cx="498342" cy="400110"/>
               </a:xfrm>
               <a:prstGeom prst="rect">
                 <a:avLst/>

</xml_diff>

<commit_message>
Corrections to before appendices M Barnes
</commit_message>
<xml_diff>
--- a/Bench_Top_Measurements/figures/wire_meas_single_wire.pptx
+++ b/Bench_Top_Measurements/figures/wire_meas_single_wire.pptx
@@ -288,7 +288,7 @@
           <a:p>
             <a:fld id="{08401B3C-8A99-46DD-A984-7821384BD389}" type="datetimeFigureOut">
               <a:rPr lang="en-GB" smtClean="0"/>
-              <a:t>22/01/2013</a:t>
+              <a:t>06/03/2013</a:t>
             </a:fld>
             <a:endParaRPr lang="en-GB"/>
           </a:p>
@@ -458,7 +458,7 @@
           <a:p>
             <a:fld id="{08401B3C-8A99-46DD-A984-7821384BD389}" type="datetimeFigureOut">
               <a:rPr lang="en-GB" smtClean="0"/>
-              <a:t>22/01/2013</a:t>
+              <a:t>06/03/2013</a:t>
             </a:fld>
             <a:endParaRPr lang="en-GB"/>
           </a:p>
@@ -638,7 +638,7 @@
           <a:p>
             <a:fld id="{08401B3C-8A99-46DD-A984-7821384BD389}" type="datetimeFigureOut">
               <a:rPr lang="en-GB" smtClean="0"/>
-              <a:t>22/01/2013</a:t>
+              <a:t>06/03/2013</a:t>
             </a:fld>
             <a:endParaRPr lang="en-GB"/>
           </a:p>
@@ -808,7 +808,7 @@
           <a:p>
             <a:fld id="{08401B3C-8A99-46DD-A984-7821384BD389}" type="datetimeFigureOut">
               <a:rPr lang="en-GB" smtClean="0"/>
-              <a:t>22/01/2013</a:t>
+              <a:t>06/03/2013</a:t>
             </a:fld>
             <a:endParaRPr lang="en-GB"/>
           </a:p>
@@ -1054,7 +1054,7 @@
           <a:p>
             <a:fld id="{08401B3C-8A99-46DD-A984-7821384BD389}" type="datetimeFigureOut">
               <a:rPr lang="en-GB" smtClean="0"/>
-              <a:t>22/01/2013</a:t>
+              <a:t>06/03/2013</a:t>
             </a:fld>
             <a:endParaRPr lang="en-GB"/>
           </a:p>
@@ -1342,7 +1342,7 @@
           <a:p>
             <a:fld id="{08401B3C-8A99-46DD-A984-7821384BD389}" type="datetimeFigureOut">
               <a:rPr lang="en-GB" smtClean="0"/>
-              <a:t>22/01/2013</a:t>
+              <a:t>06/03/2013</a:t>
             </a:fld>
             <a:endParaRPr lang="en-GB"/>
           </a:p>
@@ -1764,7 +1764,7 @@
           <a:p>
             <a:fld id="{08401B3C-8A99-46DD-A984-7821384BD389}" type="datetimeFigureOut">
               <a:rPr lang="en-GB" smtClean="0"/>
-              <a:t>22/01/2013</a:t>
+              <a:t>06/03/2013</a:t>
             </a:fld>
             <a:endParaRPr lang="en-GB"/>
           </a:p>
@@ -1882,7 +1882,7 @@
           <a:p>
             <a:fld id="{08401B3C-8A99-46DD-A984-7821384BD389}" type="datetimeFigureOut">
               <a:rPr lang="en-GB" smtClean="0"/>
-              <a:t>22/01/2013</a:t>
+              <a:t>06/03/2013</a:t>
             </a:fld>
             <a:endParaRPr lang="en-GB"/>
           </a:p>
@@ -1977,7 +1977,7 @@
           <a:p>
             <a:fld id="{08401B3C-8A99-46DD-A984-7821384BD389}" type="datetimeFigureOut">
               <a:rPr lang="en-GB" smtClean="0"/>
-              <a:t>22/01/2013</a:t>
+              <a:t>06/03/2013</a:t>
             </a:fld>
             <a:endParaRPr lang="en-GB"/>
           </a:p>
@@ -2254,7 +2254,7 @@
           <a:p>
             <a:fld id="{08401B3C-8A99-46DD-A984-7821384BD389}" type="datetimeFigureOut">
               <a:rPr lang="en-GB" smtClean="0"/>
-              <a:t>22/01/2013</a:t>
+              <a:t>06/03/2013</a:t>
             </a:fld>
             <a:endParaRPr lang="en-GB"/>
           </a:p>
@@ -2507,7 +2507,7 @@
           <a:p>
             <a:fld id="{08401B3C-8A99-46DD-A984-7821384BD389}" type="datetimeFigureOut">
               <a:rPr lang="en-GB" smtClean="0"/>
-              <a:t>22/01/2013</a:t>
+              <a:t>06/03/2013</a:t>
             </a:fld>
             <a:endParaRPr lang="en-GB"/>
           </a:p>
@@ -2720,7 +2720,7 @@
           <a:p>
             <a:fld id="{08401B3C-8A99-46DD-A984-7821384BD389}" type="datetimeFigureOut">
               <a:rPr lang="en-GB" smtClean="0"/>
-              <a:t>22/01/2013</a:t>
+              <a:t>06/03/2013</a:t>
             </a:fld>
             <a:endParaRPr lang="en-GB"/>
           </a:p>
@@ -3777,8 +3777,8 @@
           </p:sp>
         </mc:Fallback>
       </mc:AlternateContent>
-      <mc:AlternateContent xmlns:mc="http://schemas.openxmlformats.org/markup-compatibility/2006">
-        <mc:Choice xmlns:a14="http://schemas.microsoft.com/office/drawing/2010/main" Requires="a14">
+      <mc:AlternateContent xmlns:mc="http://schemas.openxmlformats.org/markup-compatibility/2006" xmlns:a14="http://schemas.microsoft.com/office/drawing/2010/main">
+        <mc:Choice Requires="a14">
           <p:sp>
             <p:nvSpPr>
               <p:cNvPr id="42" name="TextBox 41"/>
@@ -3841,7 +3841,7 @@
             </p:txBody>
           </p:sp>
         </mc:Choice>
-        <mc:Fallback>
+        <mc:Fallback xmlns="">
           <p:sp>
             <p:nvSpPr>
               <p:cNvPr id="42" name="TextBox 41"/>
@@ -3880,6 +3880,74 @@
           </p:sp>
         </mc:Fallback>
       </mc:AlternateContent>
+      <p:sp>
+        <p:nvSpPr>
+          <p:cNvPr id="2" name="TextBox 1"/>
+          <p:cNvSpPr txBox="1"/>
+          <p:nvPr/>
+        </p:nvSpPr>
+        <p:spPr>
+          <a:xfrm>
+            <a:off x="467767" y="720105"/>
+            <a:ext cx="1047082" cy="230832"/>
+          </a:xfrm>
+          <a:prstGeom prst="rect">
+            <a:avLst/>
+          </a:prstGeom>
+          <a:noFill/>
+        </p:spPr>
+        <p:txBody>
+          <a:bodyPr wrap="none" rtlCol="0">
+            <a:spAutoFit/>
+          </a:bodyPr>
+          <a:lstStyle/>
+          <a:p>
+            <a:r>
+              <a:rPr lang="en-GB" dirty="0" smtClean="0"/>
+              <a:t>Matching </a:t>
+            </a:r>
+            <a:r>
+              <a:rPr lang="en-GB" dirty="0" smtClean="0"/>
+              <a:t>network</a:t>
+            </a:r>
+            <a:endParaRPr lang="en-GB" dirty="0"/>
+          </a:p>
+        </p:txBody>
+      </p:sp>
+      <p:sp>
+        <p:nvSpPr>
+          <p:cNvPr id="19" name="TextBox 18"/>
+          <p:cNvSpPr txBox="1"/>
+          <p:nvPr/>
+        </p:nvSpPr>
+        <p:spPr>
+          <a:xfrm>
+            <a:off x="3227249" y="717849"/>
+            <a:ext cx="1047082" cy="230832"/>
+          </a:xfrm>
+          <a:prstGeom prst="rect">
+            <a:avLst/>
+          </a:prstGeom>
+          <a:noFill/>
+        </p:spPr>
+        <p:txBody>
+          <a:bodyPr wrap="none" rtlCol="0">
+            <a:spAutoFit/>
+          </a:bodyPr>
+          <a:lstStyle/>
+          <a:p>
+            <a:r>
+              <a:rPr lang="en-GB" dirty="0" smtClean="0"/>
+              <a:t>Matching </a:t>
+            </a:r>
+            <a:r>
+              <a:rPr lang="en-GB" dirty="0" smtClean="0"/>
+              <a:t>network</a:t>
+            </a:r>
+            <a:endParaRPr lang="en-GB" dirty="0"/>
+          </a:p>
+        </p:txBody>
+      </p:sp>
     </p:spTree>
     <p:extLst>
       <p:ext uri="{BB962C8B-B14F-4D97-AF65-F5344CB8AC3E}">

</xml_diff>